<commit_message>
Updated UG, DG, PPP, diagrams for addReview, editReview for DG
</commit_message>
<xml_diff>
--- a/docs/diagrams/AddReviewSequenceDiagram.pptx
+++ b/docs/diagrams/AddReviewSequenceDiagram.pptx
@@ -208,7 +208,7 @@
           <a:p>
             <a:fld id="{F5CC4B3F-88C1-4FFA-B1B6-F41C21DC6924}" type="datetimeFigureOut">
               <a:rPr lang="en-US" smtClean="0"/>
-              <a:t>4/5/2019</a:t>
+              <a:t>4/14/2019</a:t>
             </a:fld>
             <a:endParaRPr lang="en-US"/>
           </a:p>
@@ -738,7 +738,7 @@
           <a:p>
             <a:fld id="{78C97017-6FC3-485B-9764-EAC9E56C1D49}" type="datetimeFigureOut">
               <a:rPr lang="en-US" smtClean="0"/>
-              <a:t>4/5/2019</a:t>
+              <a:t>4/14/2019</a:t>
             </a:fld>
             <a:endParaRPr lang="en-US"/>
           </a:p>
@@ -906,7 +906,7 @@
           <a:p>
             <a:fld id="{78C97017-6FC3-485B-9764-EAC9E56C1D49}" type="datetimeFigureOut">
               <a:rPr lang="en-US" smtClean="0"/>
-              <a:t>4/5/2019</a:t>
+              <a:t>4/14/2019</a:t>
             </a:fld>
             <a:endParaRPr lang="en-US"/>
           </a:p>
@@ -1084,7 +1084,7 @@
           <a:p>
             <a:fld id="{78C97017-6FC3-485B-9764-EAC9E56C1D49}" type="datetimeFigureOut">
               <a:rPr lang="en-US" smtClean="0"/>
-              <a:t>4/5/2019</a:t>
+              <a:t>4/14/2019</a:t>
             </a:fld>
             <a:endParaRPr lang="en-US"/>
           </a:p>
@@ -1252,7 +1252,7 @@
           <a:p>
             <a:fld id="{78C97017-6FC3-485B-9764-EAC9E56C1D49}" type="datetimeFigureOut">
               <a:rPr lang="en-US" smtClean="0"/>
-              <a:t>4/5/2019</a:t>
+              <a:t>4/14/2019</a:t>
             </a:fld>
             <a:endParaRPr lang="en-US"/>
           </a:p>
@@ -1497,7 +1497,7 @@
           <a:p>
             <a:fld id="{78C97017-6FC3-485B-9764-EAC9E56C1D49}" type="datetimeFigureOut">
               <a:rPr lang="en-US" smtClean="0"/>
-              <a:t>4/5/2019</a:t>
+              <a:t>4/14/2019</a:t>
             </a:fld>
             <a:endParaRPr lang="en-US"/>
           </a:p>
@@ -1782,7 +1782,7 @@
           <a:p>
             <a:fld id="{78C97017-6FC3-485B-9764-EAC9E56C1D49}" type="datetimeFigureOut">
               <a:rPr lang="en-US" smtClean="0"/>
-              <a:t>4/5/2019</a:t>
+              <a:t>4/14/2019</a:t>
             </a:fld>
             <a:endParaRPr lang="en-US"/>
           </a:p>
@@ -2201,7 +2201,7 @@
           <a:p>
             <a:fld id="{78C97017-6FC3-485B-9764-EAC9E56C1D49}" type="datetimeFigureOut">
               <a:rPr lang="en-US" smtClean="0"/>
-              <a:t>4/5/2019</a:t>
+              <a:t>4/14/2019</a:t>
             </a:fld>
             <a:endParaRPr lang="en-US"/>
           </a:p>
@@ -2318,7 +2318,7 @@
           <a:p>
             <a:fld id="{78C97017-6FC3-485B-9764-EAC9E56C1D49}" type="datetimeFigureOut">
               <a:rPr lang="en-US" smtClean="0"/>
-              <a:t>4/5/2019</a:t>
+              <a:t>4/14/2019</a:t>
             </a:fld>
             <a:endParaRPr lang="en-US"/>
           </a:p>
@@ -2413,7 +2413,7 @@
           <a:p>
             <a:fld id="{78C97017-6FC3-485B-9764-EAC9E56C1D49}" type="datetimeFigureOut">
               <a:rPr lang="en-US" smtClean="0"/>
-              <a:t>4/5/2019</a:t>
+              <a:t>4/14/2019</a:t>
             </a:fld>
             <a:endParaRPr lang="en-US"/>
           </a:p>
@@ -2688,7 +2688,7 @@
           <a:p>
             <a:fld id="{78C97017-6FC3-485B-9764-EAC9E56C1D49}" type="datetimeFigureOut">
               <a:rPr lang="en-US" smtClean="0"/>
-              <a:t>4/5/2019</a:t>
+              <a:t>4/14/2019</a:t>
             </a:fld>
             <a:endParaRPr lang="en-US"/>
           </a:p>
@@ -2940,7 +2940,7 @@
           <a:p>
             <a:fld id="{78C97017-6FC3-485B-9764-EAC9E56C1D49}" type="datetimeFigureOut">
               <a:rPr lang="en-US" smtClean="0"/>
-              <a:t>4/5/2019</a:t>
+              <a:t>4/14/2019</a:t>
             </a:fld>
             <a:endParaRPr lang="en-US"/>
           </a:p>
@@ -3151,7 +3151,7 @@
           <a:p>
             <a:fld id="{78C97017-6FC3-485B-9764-EAC9E56C1D49}" type="datetimeFigureOut">
               <a:rPr lang="en-US" smtClean="0"/>
-              <a:t>4/5/2019</a:t>
+              <a:t>4/14/2019</a:t>
             </a:fld>
             <a:endParaRPr lang="en-US"/>
           </a:p>
@@ -3534,8 +3534,8 @@
         </p:nvSpPr>
         <p:spPr>
           <a:xfrm>
-            <a:off x="9601200" y="-2"/>
-            <a:ext cx="3633982" cy="7532285"/>
+            <a:off x="11229233" y="-86"/>
+            <a:ext cx="3633982" cy="7924802"/>
           </a:xfrm>
           <a:prstGeom prst="roundRect">
             <a:avLst>
@@ -3595,8 +3595,8 @@
         </p:nvSpPr>
         <p:spPr>
           <a:xfrm>
-            <a:off x="-228600" y="-1"/>
-            <a:ext cx="9846735" cy="7532285"/>
+            <a:off x="-228600" y="-2"/>
+            <a:ext cx="11440626" cy="7924802"/>
           </a:xfrm>
           <a:prstGeom prst="roundRect">
             <a:avLst>
@@ -3726,7 +3726,7 @@
         <p:spPr>
           <a:xfrm>
             <a:off x="1610959" y="685800"/>
-            <a:ext cx="0" cy="3703216"/>
+            <a:ext cx="0" cy="7086600"/>
           </a:xfrm>
           <a:prstGeom prst="line">
             <a:avLst/>
@@ -3763,7 +3763,7 @@
         <p:spPr>
           <a:xfrm>
             <a:off x="1538950" y="1258311"/>
-            <a:ext cx="164419" cy="5828277"/>
+            <a:ext cx="158771" cy="6361670"/>
           </a:xfrm>
           <a:prstGeom prst="rect">
             <a:avLst/>
@@ -3893,9 +3893,9 @@
           <p:nvPr/>
         </p:nvCxnSpPr>
         <p:spPr>
-          <a:xfrm>
-            <a:off x="4050587" y="907617"/>
-            <a:ext cx="0" cy="1482984"/>
+          <a:xfrm flipH="1">
+            <a:off x="4046473" y="907617"/>
+            <a:ext cx="4114" cy="2230779"/>
           </a:xfrm>
           <a:prstGeom prst="line">
             <a:avLst/>
@@ -3931,8 +3931,8 @@
         </p:nvSpPr>
         <p:spPr>
           <a:xfrm>
-            <a:off x="3978580" y="1365810"/>
-            <a:ext cx="146218" cy="1195546"/>
+            <a:off x="3978579" y="1365809"/>
+            <a:ext cx="157413" cy="1586411"/>
           </a:xfrm>
           <a:prstGeom prst="rect">
             <a:avLst/>
@@ -3980,13 +3980,14 @@
           <p:cNvCxnSpPr>
             <a:cxnSpLocks/>
             <a:stCxn id="21" idx="0"/>
+            <a:endCxn id="4" idx="2"/>
           </p:cNvCxnSpPr>
           <p:nvPr/>
         </p:nvCxnSpPr>
         <p:spPr>
           <a:xfrm>
-            <a:off x="6395933" y="1692478"/>
-            <a:ext cx="0" cy="937960"/>
+            <a:off x="7419842" y="1692478"/>
+            <a:ext cx="0" cy="1141798"/>
           </a:xfrm>
           <a:prstGeom prst="line">
             <a:avLst/>
@@ -4022,8 +4023,8 @@
         </p:nvSpPr>
         <p:spPr>
           <a:xfrm>
-            <a:off x="6318729" y="1692478"/>
-            <a:ext cx="154408" cy="767790"/>
+            <a:off x="7342638" y="1692478"/>
+            <a:ext cx="154408" cy="143435"/>
           </a:xfrm>
           <a:prstGeom prst="rect">
             <a:avLst/>
@@ -4172,9 +4173,9 @@
           <p:nvPr/>
         </p:nvCxnSpPr>
         <p:spPr>
-          <a:xfrm>
-            <a:off x="4114800" y="1504799"/>
-            <a:ext cx="1429612" cy="0"/>
+          <a:xfrm flipV="1">
+            <a:off x="4114800" y="1491552"/>
+            <a:ext cx="2438400" cy="13247"/>
           </a:xfrm>
           <a:prstGeom prst="straightConnector1">
             <a:avLst/>
@@ -4209,7 +4210,7 @@
         </p:nvSpPr>
         <p:spPr>
           <a:xfrm>
-            <a:off x="3243421" y="2667000"/>
+            <a:off x="5417741" y="3117235"/>
             <a:ext cx="855809" cy="215444"/>
           </a:xfrm>
           <a:prstGeom prst="rect">
@@ -4251,8 +4252,8 @@
         </p:nvCxnSpPr>
         <p:spPr>
           <a:xfrm>
-            <a:off x="4132988" y="2438400"/>
-            <a:ext cx="2150464" cy="0"/>
+            <a:off x="4122595" y="2703471"/>
+            <a:ext cx="3220043" cy="7620"/>
           </a:xfrm>
           <a:prstGeom prst="straightConnector1">
             <a:avLst/>
@@ -4291,7 +4292,7 @@
         </p:nvCxnSpPr>
         <p:spPr>
           <a:xfrm>
-            <a:off x="1691351" y="2553005"/>
+            <a:off x="1706579" y="2858245"/>
             <a:ext cx="2348067" cy="0"/>
           </a:xfrm>
           <a:prstGeom prst="straightConnector1">
@@ -4329,7 +4330,7 @@
         </p:nvCxnSpPr>
         <p:spPr>
           <a:xfrm>
-            <a:off x="380999" y="7086600"/>
+            <a:off x="419100" y="7619981"/>
             <a:ext cx="1196051" cy="0"/>
           </a:xfrm>
           <a:prstGeom prst="straightConnector1">
@@ -4367,7 +4368,7 @@
         </p:nvSpPr>
         <p:spPr>
           <a:xfrm>
-            <a:off x="8577167" y="2861379"/>
+            <a:off x="10124785" y="3350845"/>
             <a:ext cx="181826" cy="4127296"/>
           </a:xfrm>
           <a:prstGeom prst="rect">
@@ -4414,7 +4415,7 @@
         </p:nvSpPr>
         <p:spPr>
           <a:xfrm>
-            <a:off x="8714680" y="2741261"/>
+            <a:off x="10262298" y="3230727"/>
             <a:ext cx="1733347" cy="184666"/>
           </a:xfrm>
           <a:prstGeom prst="rect">
@@ -4523,7 +4524,7 @@
         </p:nvSpPr>
         <p:spPr>
           <a:xfrm>
-            <a:off x="645270" y="6841501"/>
+            <a:off x="588605" y="7378047"/>
             <a:ext cx="762000" cy="215444"/>
           </a:xfrm>
           <a:prstGeom prst="rect">
@@ -4563,8 +4564,8 @@
         </p:nvSpPr>
         <p:spPr>
           <a:xfrm>
-            <a:off x="2724792" y="2299156"/>
-            <a:ext cx="220343" cy="215444"/>
+            <a:off x="2560532" y="2627500"/>
+            <a:ext cx="435137" cy="215444"/>
           </a:xfrm>
           <a:prstGeom prst="rect">
             <a:avLst/>
@@ -4590,7 +4591,7 @@
           <a:p>
             <a:r>
               <a:rPr lang="en-US" dirty="0"/>
-              <a:t>a</a:t>
+              <a:t>com</a:t>
             </a:r>
           </a:p>
         </p:txBody>
@@ -4603,7 +4604,7 @@
         </p:nvSpPr>
         <p:spPr>
           <a:xfrm>
-            <a:off x="9905538" y="2362200"/>
+            <a:off x="11453156" y="2851666"/>
             <a:ext cx="1600662" cy="268238"/>
           </a:xfrm>
           <a:prstGeom prst="rect">
@@ -4672,7 +4673,7 @@
         </p:nvCxnSpPr>
         <p:spPr>
           <a:xfrm>
-            <a:off x="10722720" y="2653306"/>
+            <a:off x="12270338" y="3142772"/>
             <a:ext cx="29912" cy="4335369"/>
           </a:xfrm>
           <a:prstGeom prst="line">
@@ -4709,7 +4710,7 @@
         </p:nvSpPr>
         <p:spPr>
           <a:xfrm>
-            <a:off x="10619795" y="2958106"/>
+            <a:off x="12167413" y="3447572"/>
             <a:ext cx="168896" cy="318485"/>
           </a:xfrm>
           <a:prstGeom prst="rect">
@@ -4756,7 +4757,7 @@
         </p:nvSpPr>
         <p:spPr>
           <a:xfrm>
-            <a:off x="6266731" y="2572666"/>
+            <a:off x="7290640" y="2572666"/>
             <a:ext cx="258404" cy="261610"/>
           </a:xfrm>
           <a:prstGeom prst="rect">
@@ -4789,7 +4790,7 @@
         </p:nvSpPr>
         <p:spPr>
           <a:xfrm>
-            <a:off x="5523515" y="1220194"/>
+            <a:off x="6547424" y="1220194"/>
             <a:ext cx="1752185" cy="461538"/>
           </a:xfrm>
           <a:prstGeom prst="rect">
@@ -4870,9 +4871,9 @@
           <p:nvPr/>
         </p:nvCxnSpPr>
         <p:spPr>
-          <a:xfrm flipV="1">
-            <a:off x="1682176" y="2879998"/>
-            <a:ext cx="6928424" cy="45929"/>
+          <a:xfrm>
+            <a:off x="1691279" y="3344361"/>
+            <a:ext cx="8450905" cy="12532"/>
           </a:xfrm>
           <a:prstGeom prst="straightConnector1">
             <a:avLst/>
@@ -4959,8 +4960,8 @@
         </p:nvCxnSpPr>
         <p:spPr>
           <a:xfrm>
-            <a:off x="1691351" y="6980532"/>
-            <a:ext cx="6856730" cy="0"/>
+            <a:off x="1706579" y="7478141"/>
+            <a:ext cx="8418206" cy="0"/>
           </a:xfrm>
           <a:prstGeom prst="straightConnector1">
             <a:avLst/>
@@ -4999,7 +5000,7 @@
         </p:nvCxnSpPr>
         <p:spPr>
           <a:xfrm rot="16200000" flipH="1">
-            <a:off x="8646439" y="3673363"/>
+            <a:off x="10194057" y="4162829"/>
             <a:ext cx="156923" cy="76200"/>
           </a:xfrm>
           <a:prstGeom prst="curvedConnector4">
@@ -5047,7 +5048,7 @@
         </p:nvCxnSpPr>
         <p:spPr>
           <a:xfrm>
-            <a:off x="8758993" y="3270833"/>
+            <a:off x="10306611" y="3760299"/>
             <a:ext cx="1945250" cy="5758"/>
           </a:xfrm>
           <a:prstGeom prst="straightConnector1">
@@ -5092,7 +5093,7 @@
         <p:spPr>
           <a:xfrm>
             <a:off x="4122595" y="1276108"/>
-            <a:ext cx="1331191" cy="215444"/>
+            <a:ext cx="2177306" cy="215444"/>
           </a:xfrm>
           <a:prstGeom prst="rect">
             <a:avLst/>
@@ -5117,8 +5118,12 @@
           </a:lstStyle>
           <a:p>
             <a:r>
+              <a:rPr lang="en-US" dirty="0" err="1"/>
+              <a:t>AddReviewCommandParser</a:t>
+            </a:r>
+            <a:r>
               <a:rPr lang="en-US" dirty="0"/>
-              <a:t>parse(arguments)</a:t>
+              <a:t>()</a:t>
             </a:r>
           </a:p>
         </p:txBody>
@@ -5139,8 +5144,8 @@
         </p:nvCxnSpPr>
         <p:spPr>
           <a:xfrm>
-            <a:off x="6337815" y="1852624"/>
-            <a:ext cx="1434585" cy="0"/>
+            <a:off x="7497046" y="2221394"/>
+            <a:ext cx="1827847" cy="0"/>
           </a:xfrm>
           <a:prstGeom prst="straightConnector1">
             <a:avLst/>
@@ -5181,7 +5186,7 @@
         </p:nvSpPr>
         <p:spPr>
           <a:xfrm>
-            <a:off x="7777275" y="1621855"/>
+            <a:off x="9324893" y="1926657"/>
             <a:ext cx="1752185" cy="461538"/>
           </a:xfrm>
           <a:prstGeom prst="rect">
@@ -5217,12 +5222,12 @@
           <a:p>
             <a:pPr algn="ctr"/>
             <a:r>
-              <a:rPr lang="en-US" sz="1600" dirty="0">
+              <a:rPr lang="en-US" sz="1600" dirty="0" err="1">
                 <a:solidFill>
                   <a:schemeClr val="bg1"/>
                 </a:solidFill>
               </a:rPr>
-              <a:t>a:AddReview</a:t>
+              <a:t>com:AddReview</a:t>
             </a:r>
             <a:br>
               <a:rPr lang="en-US" sz="1600" dirty="0">
@@ -5261,8 +5266,8 @@
         </p:nvSpPr>
         <p:spPr>
           <a:xfrm>
-            <a:off x="8577167" y="2083393"/>
-            <a:ext cx="152400" cy="276003"/>
+            <a:off x="10112901" y="2382210"/>
+            <a:ext cx="167201" cy="216443"/>
           </a:xfrm>
           <a:prstGeom prst="rect">
             <a:avLst/>
@@ -5316,8 +5321,8 @@
         </p:nvCxnSpPr>
         <p:spPr>
           <a:xfrm>
-            <a:off x="6473137" y="2342022"/>
-            <a:ext cx="2074944" cy="1"/>
+            <a:off x="7467600" y="2590800"/>
+            <a:ext cx="2743200" cy="13838"/>
           </a:xfrm>
           <a:prstGeom prst="straightConnector1">
             <a:avLst/>
@@ -5360,8 +5365,8 @@
         </p:nvSpPr>
         <p:spPr>
           <a:xfrm>
-            <a:off x="5094057" y="2176840"/>
-            <a:ext cx="220343" cy="215444"/>
+            <a:off x="5417741" y="2480185"/>
+            <a:ext cx="349831" cy="215444"/>
           </a:xfrm>
           <a:prstGeom prst="rect">
             <a:avLst/>
@@ -5387,7 +5392,7 @@
           <a:p>
             <a:r>
               <a:rPr lang="en-US" dirty="0"/>
-              <a:t>a</a:t>
+              <a:t>com</a:t>
             </a:r>
           </a:p>
         </p:txBody>
@@ -5408,53 +5413,8 @@
         </p:nvCxnSpPr>
         <p:spPr>
           <a:xfrm>
-            <a:off x="8650588" y="2087880"/>
+            <a:off x="10198206" y="2577346"/>
             <a:ext cx="8070" cy="3017520"/>
-          </a:xfrm>
-          <a:prstGeom prst="line">
-            <a:avLst/>
-          </a:prstGeom>
-          <a:ln w="19050">
-            <a:solidFill>
-              <a:srgbClr val="0070C0"/>
-            </a:solidFill>
-            <a:prstDash val="sysDash"/>
-          </a:ln>
-          <a:effectLst/>
-        </p:spPr>
-        <p:style>
-          <a:lnRef idx="1">
-            <a:schemeClr val="accent1"/>
-          </a:lnRef>
-          <a:fillRef idx="2">
-            <a:schemeClr val="accent1"/>
-          </a:fillRef>
-          <a:effectRef idx="1">
-            <a:schemeClr val="accent1"/>
-          </a:effectRef>
-          <a:fontRef idx="minor">
-            <a:schemeClr val="dk1"/>
-          </a:fontRef>
-        </p:style>
-      </p:cxnSp>
-      <p:cxnSp>
-        <p:nvCxnSpPr>
-          <p:cNvPr id="85" name="Straight Connector 84">
-            <a:extLst>
-              <a:ext uri="{FF2B5EF4-FFF2-40B4-BE49-F238E27FC236}">
-                <a16:creationId xmlns:a16="http://schemas.microsoft.com/office/drawing/2014/main" id="{7332A4B2-B8B7-4788-81E0-BB1D68AE4874}"/>
-              </a:ext>
-            </a:extLst>
-          </p:cNvPr>
-          <p:cNvCxnSpPr>
-            <a:cxnSpLocks/>
-          </p:cNvCxnSpPr>
-          <p:nvPr/>
-        </p:nvCxnSpPr>
-        <p:spPr>
-          <a:xfrm flipH="1">
-            <a:off x="4059150" y="2514600"/>
-            <a:ext cx="9554" cy="136439"/>
           </a:xfrm>
           <a:prstGeom prst="line">
             <a:avLst/>
@@ -5498,7 +5458,7 @@
         </p:nvCxnSpPr>
         <p:spPr>
           <a:xfrm>
-            <a:off x="8749552" y="2975344"/>
+            <a:off x="10297170" y="3464810"/>
             <a:ext cx="1892849" cy="0"/>
           </a:xfrm>
           <a:prstGeom prst="straightConnector1">
@@ -5540,7 +5500,7 @@
         </p:nvSpPr>
         <p:spPr>
           <a:xfrm>
-            <a:off x="9012058" y="3084198"/>
+            <a:off x="10559676" y="3573664"/>
             <a:ext cx="1231036" cy="184666"/>
           </a:xfrm>
           <a:prstGeom prst="rect">
@@ -5591,7 +5551,7 @@
         </p:nvSpPr>
         <p:spPr>
           <a:xfrm>
-            <a:off x="9036638" y="3352800"/>
+            <a:off x="10584256" y="3842266"/>
             <a:ext cx="1331191" cy="430887"/>
           </a:xfrm>
           <a:prstGeom prst="rect">
@@ -5643,7 +5603,7 @@
         </p:nvCxnSpPr>
         <p:spPr>
           <a:xfrm>
-            <a:off x="8763000" y="4038600"/>
+            <a:off x="10310618" y="4528066"/>
             <a:ext cx="1892849" cy="0"/>
           </a:xfrm>
           <a:prstGeom prst="straightConnector1">
@@ -5685,7 +5645,7 @@
         </p:nvSpPr>
         <p:spPr>
           <a:xfrm>
-            <a:off x="10651504" y="4038600"/>
+            <a:off x="12199122" y="4528066"/>
             <a:ext cx="168896" cy="148125"/>
           </a:xfrm>
           <a:prstGeom prst="rect">
@@ -5738,7 +5698,7 @@
         </p:nvSpPr>
         <p:spPr>
           <a:xfrm>
-            <a:off x="9103387" y="3853934"/>
+            <a:off x="10651005" y="4343400"/>
             <a:ext cx="1011960" cy="184666"/>
           </a:xfrm>
           <a:prstGeom prst="rect">
@@ -5804,7 +5764,7 @@
         </p:nvCxnSpPr>
         <p:spPr>
           <a:xfrm flipV="1">
-            <a:off x="8735937" y="4186725"/>
+            <a:off x="10283555" y="4676191"/>
             <a:ext cx="2000015" cy="4276"/>
           </a:xfrm>
           <a:prstGeom prst="straightConnector1">
@@ -5850,7 +5810,7 @@
         </p:nvCxnSpPr>
         <p:spPr>
           <a:xfrm flipV="1">
-            <a:off x="8735937" y="4576274"/>
+            <a:off x="10283555" y="5065740"/>
             <a:ext cx="1942968" cy="1"/>
           </a:xfrm>
           <a:prstGeom prst="straightConnector1">
@@ -5892,7 +5852,7 @@
         </p:nvSpPr>
         <p:spPr>
           <a:xfrm>
-            <a:off x="10651504" y="4576275"/>
+            <a:off x="12199122" y="5065741"/>
             <a:ext cx="168896" cy="148125"/>
           </a:xfrm>
           <a:prstGeom prst="rect">
@@ -5945,7 +5905,7 @@
         </p:nvSpPr>
         <p:spPr>
           <a:xfrm>
-            <a:off x="8678369" y="4343400"/>
+            <a:off x="10225987" y="4832866"/>
             <a:ext cx="1989631" cy="184666"/>
           </a:xfrm>
           <a:prstGeom prst="rect">
@@ -6010,7 +5970,7 @@
         </p:nvCxnSpPr>
         <p:spPr>
           <a:xfrm>
-            <a:off x="8735937" y="4724400"/>
+            <a:off x="10283555" y="5213866"/>
             <a:ext cx="1901547" cy="0"/>
           </a:xfrm>
           <a:prstGeom prst="straightConnector1">
@@ -6056,7 +6016,7 @@
         </p:nvCxnSpPr>
         <p:spPr>
           <a:xfrm flipV="1">
-            <a:off x="8735937" y="5109674"/>
+            <a:off x="10283555" y="5599140"/>
             <a:ext cx="1942968" cy="1"/>
           </a:xfrm>
           <a:prstGeom prst="straightConnector1">
@@ -6098,7 +6058,7 @@
         </p:nvSpPr>
         <p:spPr>
           <a:xfrm>
-            <a:off x="10651504" y="5109675"/>
+            <a:off x="12199122" y="5599141"/>
             <a:ext cx="168896" cy="148125"/>
           </a:xfrm>
           <a:prstGeom prst="rect">
@@ -6151,7 +6111,7 @@
         </p:nvSpPr>
         <p:spPr>
           <a:xfrm>
-            <a:off x="8678369" y="4876800"/>
+            <a:off x="10225987" y="5366266"/>
             <a:ext cx="1989631" cy="184666"/>
           </a:xfrm>
           <a:prstGeom prst="rect">
@@ -6216,7 +6176,7 @@
         </p:nvCxnSpPr>
         <p:spPr>
           <a:xfrm>
-            <a:off x="8735937" y="5257800"/>
+            <a:off x="10283555" y="5747266"/>
             <a:ext cx="1901547" cy="0"/>
           </a:xfrm>
           <a:prstGeom prst="straightConnector1">
@@ -6262,7 +6222,7 @@
         </p:nvCxnSpPr>
         <p:spPr>
           <a:xfrm flipV="1">
-            <a:off x="8744368" y="5643074"/>
+            <a:off x="10291986" y="6132540"/>
             <a:ext cx="1942968" cy="1"/>
           </a:xfrm>
           <a:prstGeom prst="straightConnector1">
@@ -6304,7 +6264,7 @@
         </p:nvSpPr>
         <p:spPr>
           <a:xfrm>
-            <a:off x="10659935" y="5643075"/>
+            <a:off x="12207553" y="6132541"/>
             <a:ext cx="168896" cy="148125"/>
           </a:xfrm>
           <a:prstGeom prst="rect">
@@ -6357,7 +6317,7 @@
         </p:nvSpPr>
         <p:spPr>
           <a:xfrm>
-            <a:off x="8686800" y="5410200"/>
+            <a:off x="10234418" y="5899666"/>
             <a:ext cx="1989631" cy="184666"/>
           </a:xfrm>
           <a:prstGeom prst="rect">
@@ -6422,7 +6382,7 @@
         </p:nvCxnSpPr>
         <p:spPr>
           <a:xfrm>
-            <a:off x="8744368" y="5791200"/>
+            <a:off x="10291986" y="6280666"/>
             <a:ext cx="1901547" cy="0"/>
           </a:xfrm>
           <a:prstGeom prst="straightConnector1">
@@ -6468,7 +6428,7 @@
         </p:nvCxnSpPr>
         <p:spPr>
           <a:xfrm flipV="1">
-            <a:off x="8744368" y="6100274"/>
+            <a:off x="10291986" y="6589740"/>
             <a:ext cx="1942968" cy="1"/>
           </a:xfrm>
           <a:prstGeom prst="straightConnector1">
@@ -6510,7 +6470,7 @@
         </p:nvSpPr>
         <p:spPr>
           <a:xfrm>
-            <a:off x="10659935" y="6100275"/>
+            <a:off x="12207553" y="6589741"/>
             <a:ext cx="167841" cy="609599"/>
           </a:xfrm>
           <a:prstGeom prst="rect">
@@ -6563,7 +6523,7 @@
         </p:nvSpPr>
         <p:spPr>
           <a:xfrm>
-            <a:off x="8686800" y="5867400"/>
+            <a:off x="10234418" y="6356866"/>
             <a:ext cx="1989631" cy="184666"/>
           </a:xfrm>
           <a:prstGeom prst="rect">
@@ -6629,7 +6589,7 @@
         </p:nvCxnSpPr>
         <p:spPr>
           <a:xfrm>
-            <a:off x="8744368" y="6705600"/>
+            <a:off x="10291986" y="7195066"/>
             <a:ext cx="1999488" cy="4274"/>
           </a:xfrm>
           <a:prstGeom prst="straightConnector1">
@@ -6673,7 +6633,7 @@
         </p:nvSpPr>
         <p:spPr>
           <a:xfrm>
-            <a:off x="11199303" y="5515014"/>
+            <a:off x="12746921" y="6004480"/>
             <a:ext cx="1940855" cy="311395"/>
           </a:xfrm>
           <a:prstGeom prst="rect">
@@ -6748,7 +6708,7 @@
         </p:nvCxnSpPr>
         <p:spPr>
           <a:xfrm>
-            <a:off x="12192001" y="5498705"/>
+            <a:off x="13739619" y="5988171"/>
             <a:ext cx="2175" cy="1555629"/>
           </a:xfrm>
           <a:prstGeom prst="line">
@@ -6791,7 +6751,7 @@
         </p:nvSpPr>
         <p:spPr>
           <a:xfrm>
-            <a:off x="12106497" y="6234715"/>
+            <a:off x="13654115" y="6724181"/>
             <a:ext cx="168896" cy="318485"/>
           </a:xfrm>
           <a:prstGeom prst="rect">
@@ -6846,7 +6806,7 @@
         </p:nvCxnSpPr>
         <p:spPr>
           <a:xfrm>
-            <a:off x="10827776" y="6248400"/>
+            <a:off x="12375394" y="6737866"/>
             <a:ext cx="1278721" cy="0"/>
           </a:xfrm>
           <a:prstGeom prst="straightConnector1">
@@ -6888,7 +6848,7 @@
         </p:nvSpPr>
         <p:spPr>
           <a:xfrm>
-            <a:off x="11158339" y="6063734"/>
+            <a:off x="12705957" y="6553200"/>
             <a:ext cx="737292" cy="184666"/>
           </a:xfrm>
           <a:prstGeom prst="rect">
@@ -6943,7 +6903,7 @@
         </p:nvCxnSpPr>
         <p:spPr>
           <a:xfrm>
-            <a:off x="10827776" y="6553200"/>
+            <a:off x="12375394" y="7042666"/>
             <a:ext cx="1288024" cy="0"/>
           </a:xfrm>
           <a:prstGeom prst="straightConnector1">
@@ -6987,7 +6947,7 @@
         </p:nvSpPr>
         <p:spPr>
           <a:xfrm>
-            <a:off x="4267200" y="6781800"/>
+            <a:off x="5246817" y="7265932"/>
             <a:ext cx="762000" cy="215444"/>
           </a:xfrm>
           <a:prstGeom prst="rect">
@@ -7015,6 +6975,337 @@
             <a:r>
               <a:rPr lang="en-US" dirty="0"/>
               <a:t>result</a:t>
+            </a:r>
+          </a:p>
+        </p:txBody>
+      </p:sp>
+      <p:cxnSp>
+        <p:nvCxnSpPr>
+          <p:cNvPr id="73" name="Straight Arrow Connector 72">
+            <a:extLst>
+              <a:ext uri="{FF2B5EF4-FFF2-40B4-BE49-F238E27FC236}">
+                <a16:creationId xmlns:a16="http://schemas.microsoft.com/office/drawing/2014/main" id="{BA7FD8C4-79ED-4BD3-8ECC-91675C9FA428}"/>
+              </a:ext>
+            </a:extLst>
+          </p:cNvPr>
+          <p:cNvCxnSpPr>
+            <a:cxnSpLocks/>
+          </p:cNvCxnSpPr>
+          <p:nvPr/>
+        </p:nvCxnSpPr>
+        <p:spPr>
+          <a:xfrm>
+            <a:off x="4099230" y="1835913"/>
+            <a:ext cx="3243408" cy="1471"/>
+          </a:xfrm>
+          <a:prstGeom prst="straightConnector1">
+            <a:avLst/>
+          </a:prstGeom>
+          <a:ln w="19050">
+            <a:solidFill>
+              <a:srgbClr val="0070C0"/>
+            </a:solidFill>
+            <a:prstDash val="sysDash"/>
+            <a:headEnd type="arrow" w="med" len="med"/>
+            <a:tailEnd type="none" w="med" len="med"/>
+          </a:ln>
+        </p:spPr>
+        <p:style>
+          <a:lnRef idx="1">
+            <a:schemeClr val="accent1"/>
+          </a:lnRef>
+          <a:fillRef idx="0">
+            <a:schemeClr val="accent1"/>
+          </a:fillRef>
+          <a:effectRef idx="0">
+            <a:schemeClr val="accent1"/>
+          </a:effectRef>
+          <a:fontRef idx="minor">
+            <a:schemeClr val="tx1"/>
+          </a:fontRef>
+        </p:style>
+      </p:cxnSp>
+      <p:sp>
+        <p:nvSpPr>
+          <p:cNvPr id="76" name="Rectangle 75">
+            <a:extLst>
+              <a:ext uri="{FF2B5EF4-FFF2-40B4-BE49-F238E27FC236}">
+                <a16:creationId xmlns:a16="http://schemas.microsoft.com/office/drawing/2014/main" id="{609DEC2B-447C-476F-9F72-F444B6BC8C0D}"/>
+              </a:ext>
+            </a:extLst>
+          </p:cNvPr>
+          <p:cNvSpPr/>
+          <p:nvPr/>
+        </p:nvSpPr>
+        <p:spPr>
+          <a:xfrm>
+            <a:off x="7348938" y="2121468"/>
+            <a:ext cx="154397" cy="621732"/>
+          </a:xfrm>
+          <a:prstGeom prst="rect">
+            <a:avLst/>
+          </a:prstGeom>
+          <a:solidFill>
+            <a:srgbClr val="0070C0"/>
+          </a:solidFill>
+          <a:ln>
+            <a:solidFill>
+              <a:srgbClr val="0070C0"/>
+            </a:solidFill>
+          </a:ln>
+          <a:effectLst/>
+        </p:spPr>
+        <p:style>
+          <a:lnRef idx="1">
+            <a:schemeClr val="accent3"/>
+          </a:lnRef>
+          <a:fillRef idx="2">
+            <a:schemeClr val="accent3"/>
+          </a:fillRef>
+          <a:effectRef idx="1">
+            <a:schemeClr val="accent3"/>
+          </a:effectRef>
+          <a:fontRef idx="minor">
+            <a:schemeClr val="dk1"/>
+          </a:fontRef>
+        </p:style>
+        <p:txBody>
+          <a:bodyPr rtlCol="0" anchor="ctr"/>
+          <a:lstStyle/>
+          <a:p>
+            <a:pPr algn="ctr"/>
+            <a:endParaRPr lang="en-SG" sz="1400"/>
+          </a:p>
+        </p:txBody>
+      </p:sp>
+      <p:sp>
+        <p:nvSpPr>
+          <p:cNvPr id="78" name="TextBox 77">
+            <a:extLst>
+              <a:ext uri="{FF2B5EF4-FFF2-40B4-BE49-F238E27FC236}">
+                <a16:creationId xmlns:a16="http://schemas.microsoft.com/office/drawing/2014/main" id="{207F877D-86A1-4CAC-98DC-7888A7CC003B}"/>
+              </a:ext>
+            </a:extLst>
+          </p:cNvPr>
+          <p:cNvSpPr txBox="1"/>
+          <p:nvPr/>
+        </p:nvSpPr>
+        <p:spPr>
+          <a:xfrm>
+            <a:off x="4594175" y="1883500"/>
+            <a:ext cx="1344978" cy="213973"/>
+          </a:xfrm>
+          <a:prstGeom prst="rect">
+            <a:avLst/>
+          </a:prstGeom>
+          <a:noFill/>
+        </p:spPr>
+        <p:txBody>
+          <a:bodyPr wrap="square" lIns="0" tIns="0" rIns="0" bIns="0" rtlCol="0">
+            <a:spAutoFit/>
+          </a:bodyPr>
+          <a:lstStyle>
+            <a:defPPr>
+              <a:defRPr lang="en-US"/>
+            </a:defPPr>
+            <a:lvl1pPr algn="r">
+              <a:defRPr sz="1400">
+                <a:solidFill>
+                  <a:srgbClr val="0070C0"/>
+                </a:solidFill>
+              </a:defRPr>
+            </a:lvl1pPr>
+          </a:lstStyle>
+          <a:p>
+            <a:r>
+              <a:rPr lang="en-US" dirty="0"/>
+              <a:t>parse(arguments)</a:t>
+            </a:r>
+          </a:p>
+        </p:txBody>
+      </p:sp>
+      <p:cxnSp>
+        <p:nvCxnSpPr>
+          <p:cNvPr id="82" name="Straight Arrow Connector 81">
+            <a:extLst>
+              <a:ext uri="{FF2B5EF4-FFF2-40B4-BE49-F238E27FC236}">
+                <a16:creationId xmlns:a16="http://schemas.microsoft.com/office/drawing/2014/main" id="{64489C63-3BC7-4C13-818C-46A34229B53B}"/>
+              </a:ext>
+            </a:extLst>
+          </p:cNvPr>
+          <p:cNvCxnSpPr>
+            <a:cxnSpLocks/>
+          </p:cNvCxnSpPr>
+          <p:nvPr/>
+        </p:nvCxnSpPr>
+        <p:spPr>
+          <a:xfrm>
+            <a:off x="4132987" y="2107405"/>
+            <a:ext cx="3246120" cy="1015"/>
+          </a:xfrm>
+          <a:prstGeom prst="straightConnector1">
+            <a:avLst/>
+          </a:prstGeom>
+          <a:ln w="19050">
+            <a:solidFill>
+              <a:srgbClr val="0070C0"/>
+            </a:solidFill>
+            <a:tailEnd type="arrow"/>
+          </a:ln>
+        </p:spPr>
+        <p:style>
+          <a:lnRef idx="1">
+            <a:schemeClr val="accent1"/>
+          </a:lnRef>
+          <a:fillRef idx="0">
+            <a:schemeClr val="accent1"/>
+          </a:fillRef>
+          <a:effectRef idx="0">
+            <a:schemeClr val="accent1"/>
+          </a:effectRef>
+          <a:fontRef idx="minor">
+            <a:schemeClr val="tx1"/>
+          </a:fontRef>
+        </p:style>
+      </p:cxnSp>
+      <p:sp>
+        <p:nvSpPr>
+          <p:cNvPr id="86" name="TextBox 85">
+            <a:extLst>
+              <a:ext uri="{FF2B5EF4-FFF2-40B4-BE49-F238E27FC236}">
+                <a16:creationId xmlns:a16="http://schemas.microsoft.com/office/drawing/2014/main" id="{DBF51F22-0D60-4584-B0F9-E33BB7AADB23}"/>
+              </a:ext>
+            </a:extLst>
+          </p:cNvPr>
+          <p:cNvSpPr txBox="1"/>
+          <p:nvPr/>
+        </p:nvSpPr>
+        <p:spPr>
+          <a:xfrm>
+            <a:off x="7024012" y="1961433"/>
+            <a:ext cx="2177306" cy="215444"/>
+          </a:xfrm>
+          <a:prstGeom prst="rect">
+            <a:avLst/>
+          </a:prstGeom>
+          <a:noFill/>
+        </p:spPr>
+        <p:txBody>
+          <a:bodyPr wrap="square" lIns="0" tIns="0" rIns="0" bIns="0" rtlCol="0">
+            <a:spAutoFit/>
+          </a:bodyPr>
+          <a:lstStyle>
+            <a:defPPr>
+              <a:defRPr lang="en-US"/>
+            </a:defPPr>
+            <a:lvl1pPr algn="r">
+              <a:defRPr sz="1400">
+                <a:solidFill>
+                  <a:srgbClr val="0070C0"/>
+                </a:solidFill>
+              </a:defRPr>
+            </a:lvl1pPr>
+          </a:lstStyle>
+          <a:p>
+            <a:r>
+              <a:rPr lang="en-US" dirty="0" err="1"/>
+              <a:t>AddReviewCommand</a:t>
+            </a:r>
+            <a:r>
+              <a:rPr lang="en-US" dirty="0"/>
+              <a:t>()</a:t>
+            </a:r>
+          </a:p>
+        </p:txBody>
+      </p:sp>
+      <p:sp>
+        <p:nvSpPr>
+          <p:cNvPr id="91" name="TextBox 90">
+            <a:extLst>
+              <a:ext uri="{FF2B5EF4-FFF2-40B4-BE49-F238E27FC236}">
+                <a16:creationId xmlns:a16="http://schemas.microsoft.com/office/drawing/2014/main" id="{22715C41-402B-4670-9CE6-1B3BE4984375}"/>
+              </a:ext>
+            </a:extLst>
+          </p:cNvPr>
+          <p:cNvSpPr txBox="1"/>
+          <p:nvPr/>
+        </p:nvSpPr>
+        <p:spPr>
+          <a:xfrm>
+            <a:off x="8549778" y="2350753"/>
+            <a:ext cx="349831" cy="215444"/>
+          </a:xfrm>
+          <a:prstGeom prst="rect">
+            <a:avLst/>
+          </a:prstGeom>
+          <a:noFill/>
+        </p:spPr>
+        <p:txBody>
+          <a:bodyPr wrap="square" lIns="0" tIns="0" rIns="0" bIns="0" rtlCol="0">
+            <a:spAutoFit/>
+          </a:bodyPr>
+          <a:lstStyle>
+            <a:defPPr>
+              <a:defRPr lang="en-US"/>
+            </a:defPPr>
+            <a:lvl1pPr algn="r">
+              <a:defRPr sz="1400">
+                <a:solidFill>
+                  <a:srgbClr val="0070C0"/>
+                </a:solidFill>
+              </a:defRPr>
+            </a:lvl1pPr>
+          </a:lstStyle>
+          <a:p>
+            <a:r>
+              <a:rPr lang="en-US" dirty="0"/>
+              <a:t>com</a:t>
+            </a:r>
+          </a:p>
+        </p:txBody>
+      </p:sp>
+      <p:sp>
+        <p:nvSpPr>
+          <p:cNvPr id="98" name="TextBox 97">
+            <a:extLst>
+              <a:ext uri="{FF2B5EF4-FFF2-40B4-BE49-F238E27FC236}">
+                <a16:creationId xmlns:a16="http://schemas.microsoft.com/office/drawing/2014/main" id="{0B921FD1-B917-4C05-80E2-065FDD92446A}"/>
+              </a:ext>
+            </a:extLst>
+          </p:cNvPr>
+          <p:cNvSpPr txBox="1"/>
+          <p:nvPr/>
+        </p:nvSpPr>
+        <p:spPr>
+          <a:xfrm>
+            <a:off x="7037349" y="2794206"/>
+            <a:ext cx="435137" cy="215444"/>
+          </a:xfrm>
+          <a:prstGeom prst="rect">
+            <a:avLst/>
+          </a:prstGeom>
+          <a:noFill/>
+        </p:spPr>
+        <p:txBody>
+          <a:bodyPr wrap="square" lIns="0" tIns="0" rIns="0" bIns="0" rtlCol="0">
+            <a:spAutoFit/>
+          </a:bodyPr>
+          <a:lstStyle>
+            <a:defPPr>
+              <a:defRPr lang="en-US"/>
+            </a:defPPr>
+            <a:lvl1pPr algn="r">
+              <a:defRPr sz="1400">
+                <a:solidFill>
+                  <a:srgbClr val="0070C0"/>
+                </a:solidFill>
+              </a:defRPr>
+            </a:lvl1pPr>
+          </a:lstStyle>
+          <a:p>
+            <a:r>
+              <a:rPr lang="en-US" dirty="0"/>
+              <a:t>x</a:t>
             </a:r>
           </a:p>
         </p:txBody>

</xml_diff>